<commit_message>
task creation bug resolve
</commit_message>
<xml_diff>
--- a/rdelay.pptx
+++ b/rdelay.pptx
@@ -4820,7 +4820,7 @@
         </p:nvSpPr>
         <p:spPr>
           <a:xfrm>
-            <a:off x="4487335" y="1947331"/>
+            <a:off x="4766735" y="1938864"/>
             <a:ext cx="1617133" cy="880534"/>
           </a:xfrm>
           <a:prstGeom prst="rect">
@@ -4864,7 +4864,7 @@
         </p:nvSpPr>
         <p:spPr>
           <a:xfrm>
-            <a:off x="7412567" y="4993213"/>
+            <a:off x="7691967" y="4984746"/>
             <a:ext cx="3873501" cy="880534"/>
           </a:xfrm>
           <a:prstGeom prst="rect">
@@ -4908,7 +4908,7 @@
         </p:nvSpPr>
         <p:spPr>
           <a:xfrm>
-            <a:off x="8297333" y="1947331"/>
+            <a:off x="8576733" y="1938864"/>
             <a:ext cx="2548467" cy="880534"/>
           </a:xfrm>
           <a:prstGeom prst="rect">
@@ -4952,7 +4952,7 @@
         </p:nvSpPr>
         <p:spPr>
           <a:xfrm>
-            <a:off x="4178301" y="4972619"/>
+            <a:off x="4457701" y="4964152"/>
             <a:ext cx="2235200" cy="880534"/>
           </a:xfrm>
           <a:prstGeom prst="rect">
@@ -4996,7 +4996,7 @@
         </p:nvSpPr>
         <p:spPr>
           <a:xfrm>
-            <a:off x="1490136" y="3610497"/>
+            <a:off x="1769536" y="3602030"/>
             <a:ext cx="1617133" cy="880534"/>
           </a:xfrm>
           <a:prstGeom prst="rect">
@@ -5043,7 +5043,7 @@
         </p:nvCxnSpPr>
         <p:spPr>
           <a:xfrm rot="5400000">
-            <a:off x="3405987" y="1720582"/>
+            <a:off x="3685387" y="1712115"/>
             <a:ext cx="782632" cy="2997199"/>
           </a:xfrm>
           <a:prstGeom prst="bentConnector3">
@@ -5079,7 +5079,7 @@
         </p:nvCxnSpPr>
         <p:spPr>
           <a:xfrm>
-            <a:off x="3107269" y="4050764"/>
+            <a:off x="3386669" y="4042297"/>
             <a:ext cx="1071032" cy="1362122"/>
           </a:xfrm>
           <a:prstGeom prst="bentConnector3">
@@ -5115,7 +5115,7 @@
         </p:nvCxnSpPr>
         <p:spPr>
           <a:xfrm rot="10800000" flipH="1">
-            <a:off x="1490135" y="2387598"/>
+            <a:off x="1769535" y="2379131"/>
             <a:ext cx="2997199" cy="1663166"/>
           </a:xfrm>
           <a:prstGeom prst="bentConnector3">
@@ -5153,7 +5153,7 @@
         </p:nvCxnSpPr>
         <p:spPr>
           <a:xfrm>
-            <a:off x="6104468" y="2387598"/>
+            <a:off x="6383868" y="2379131"/>
             <a:ext cx="2192865" cy="12700"/>
           </a:xfrm>
           <a:prstGeom prst="bentConnector3">
@@ -5191,7 +5191,7 @@
         </p:nvCxnSpPr>
         <p:spPr>
           <a:xfrm>
-            <a:off x="6104468" y="2387598"/>
+            <a:off x="6383868" y="2379131"/>
             <a:ext cx="1308099" cy="3045882"/>
           </a:xfrm>
           <a:prstGeom prst="bentConnector3">
@@ -5227,7 +5227,7 @@
         </p:nvCxnSpPr>
         <p:spPr>
           <a:xfrm rot="5400000">
-            <a:off x="4223525" y="3900242"/>
+            <a:off x="4502925" y="3891775"/>
             <a:ext cx="2144754" cy="1"/>
           </a:xfrm>
           <a:prstGeom prst="bentConnector3">
@@ -5262,7 +5262,7 @@
         </p:nvSpPr>
         <p:spPr>
           <a:xfrm>
-            <a:off x="4239684" y="698737"/>
+            <a:off x="4519084" y="690270"/>
             <a:ext cx="2095501" cy="575733"/>
           </a:xfrm>
           <a:prstGeom prst="rect">
@@ -5309,7 +5309,7 @@
         </p:nvCxnSpPr>
         <p:spPr>
           <a:xfrm rot="16200000" flipH="1">
-            <a:off x="4955238" y="1606666"/>
+            <a:off x="5234638" y="1598199"/>
             <a:ext cx="672861" cy="8467"/>
           </a:xfrm>
           <a:prstGeom prst="bentConnector3">
@@ -5342,7 +5342,7 @@
         </p:nvSpPr>
         <p:spPr>
           <a:xfrm>
-            <a:off x="2468035" y="2893063"/>
+            <a:off x="2747435" y="2884596"/>
             <a:ext cx="2461682" cy="338554"/>
           </a:xfrm>
           <a:prstGeom prst="rect">
@@ -5373,7 +5373,7 @@
         </p:nvSpPr>
         <p:spPr>
           <a:xfrm>
-            <a:off x="1974854" y="2089734"/>
+            <a:off x="2254254" y="2081267"/>
             <a:ext cx="2264830" cy="338554"/>
           </a:xfrm>
           <a:prstGeom prst="rect">
@@ -5404,7 +5404,7 @@
         </p:nvSpPr>
         <p:spPr>
           <a:xfrm>
-            <a:off x="4555066" y="4321754"/>
+            <a:off x="4834466" y="4313287"/>
             <a:ext cx="1714501" cy="338554"/>
           </a:xfrm>
           <a:prstGeom prst="rect">

</xml_diff>